<commit_message>
finish first draft of presentation
</commit_message>
<xml_diff>
--- a/project/presentation/xitongliu.pptx
+++ b/project/presentation/xitongliu.pptx
@@ -294,7 +294,8 @@
           <a:p>
             <a:fld id="{D3DF38D7-36C7-B34C-AE7F-468805AC0DF2}" type="datetimeFigureOut">
               <a:rPr lang="en-US" smtClean="0"/>
-              <a:t>5/11/10</a:t>
+              <a:pPr/>
+              <a:t>5/12/10</a:t>
             </a:fld>
             <a:endParaRPr lang="en-US"/>
           </a:p>
@@ -336,6 +337,7 @@
           <a:p>
             <a:fld id="{96414F00-A310-6D42-B069-32C3B6104FF0}" type="slidenum">
               <a:rPr lang="en-US" smtClean="0"/>
+              <a:pPr/>
               <a:t>‹#›</a:t>
             </a:fld>
             <a:endParaRPr lang="en-US"/>
@@ -459,7 +461,8 @@
           <a:p>
             <a:fld id="{D3DF38D7-36C7-B34C-AE7F-468805AC0DF2}" type="datetimeFigureOut">
               <a:rPr lang="en-US" smtClean="0"/>
-              <a:t>5/11/10</a:t>
+              <a:pPr/>
+              <a:t>5/12/10</a:t>
             </a:fld>
             <a:endParaRPr lang="en-US"/>
           </a:p>
@@ -501,6 +504,7 @@
           <a:p>
             <a:fld id="{96414F00-A310-6D42-B069-32C3B6104FF0}" type="slidenum">
               <a:rPr lang="en-US" smtClean="0"/>
+              <a:pPr/>
               <a:t>‹#›</a:t>
             </a:fld>
             <a:endParaRPr lang="en-US"/>
@@ -634,7 +638,8 @@
           <a:p>
             <a:fld id="{D3DF38D7-36C7-B34C-AE7F-468805AC0DF2}" type="datetimeFigureOut">
               <a:rPr lang="en-US" smtClean="0"/>
-              <a:t>5/11/10</a:t>
+              <a:pPr/>
+              <a:t>5/12/10</a:t>
             </a:fld>
             <a:endParaRPr lang="en-US"/>
           </a:p>
@@ -676,6 +681,7 @@
           <a:p>
             <a:fld id="{96414F00-A310-6D42-B069-32C3B6104FF0}" type="slidenum">
               <a:rPr lang="en-US" smtClean="0"/>
+              <a:pPr/>
               <a:t>‹#›</a:t>
             </a:fld>
             <a:endParaRPr lang="en-US"/>
@@ -799,7 +805,8 @@
           <a:p>
             <a:fld id="{D3DF38D7-36C7-B34C-AE7F-468805AC0DF2}" type="datetimeFigureOut">
               <a:rPr lang="en-US" smtClean="0"/>
-              <a:t>5/11/10</a:t>
+              <a:pPr/>
+              <a:t>5/12/10</a:t>
             </a:fld>
             <a:endParaRPr lang="en-US"/>
           </a:p>
@@ -841,6 +848,7 @@
           <a:p>
             <a:fld id="{96414F00-A310-6D42-B069-32C3B6104FF0}" type="slidenum">
               <a:rPr lang="en-US" smtClean="0"/>
+              <a:pPr/>
               <a:t>‹#›</a:t>
             </a:fld>
             <a:endParaRPr lang="en-US"/>
@@ -1040,7 +1048,8 @@
           <a:p>
             <a:fld id="{D3DF38D7-36C7-B34C-AE7F-468805AC0DF2}" type="datetimeFigureOut">
               <a:rPr lang="en-US" smtClean="0"/>
-              <a:t>5/11/10</a:t>
+              <a:pPr/>
+              <a:t>5/12/10</a:t>
             </a:fld>
             <a:endParaRPr lang="en-US"/>
           </a:p>
@@ -1082,6 +1091,7 @@
           <a:p>
             <a:fld id="{96414F00-A310-6D42-B069-32C3B6104FF0}" type="slidenum">
               <a:rPr lang="en-US" smtClean="0"/>
+              <a:pPr/>
               <a:t>‹#›</a:t>
             </a:fld>
             <a:endParaRPr lang="en-US"/>
@@ -1323,7 +1333,8 @@
           <a:p>
             <a:fld id="{D3DF38D7-36C7-B34C-AE7F-468805AC0DF2}" type="datetimeFigureOut">
               <a:rPr lang="en-US" smtClean="0"/>
-              <a:t>5/11/10</a:t>
+              <a:pPr/>
+              <a:t>5/12/10</a:t>
             </a:fld>
             <a:endParaRPr lang="en-US"/>
           </a:p>
@@ -1365,6 +1376,7 @@
           <a:p>
             <a:fld id="{96414F00-A310-6D42-B069-32C3B6104FF0}" type="slidenum">
               <a:rPr lang="en-US" smtClean="0"/>
+              <a:pPr/>
               <a:t>‹#›</a:t>
             </a:fld>
             <a:endParaRPr lang="en-US"/>
@@ -1740,7 +1752,8 @@
           <a:p>
             <a:fld id="{D3DF38D7-36C7-B34C-AE7F-468805AC0DF2}" type="datetimeFigureOut">
               <a:rPr lang="en-US" smtClean="0"/>
-              <a:t>5/11/10</a:t>
+              <a:pPr/>
+              <a:t>5/12/10</a:t>
             </a:fld>
             <a:endParaRPr lang="en-US"/>
           </a:p>
@@ -1782,6 +1795,7 @@
           <a:p>
             <a:fld id="{96414F00-A310-6D42-B069-32C3B6104FF0}" type="slidenum">
               <a:rPr lang="en-US" smtClean="0"/>
+              <a:pPr/>
               <a:t>‹#›</a:t>
             </a:fld>
             <a:endParaRPr lang="en-US"/>
@@ -1853,7 +1867,8 @@
           <a:p>
             <a:fld id="{D3DF38D7-36C7-B34C-AE7F-468805AC0DF2}" type="datetimeFigureOut">
               <a:rPr lang="en-US" smtClean="0"/>
-              <a:t>5/11/10</a:t>
+              <a:pPr/>
+              <a:t>5/12/10</a:t>
             </a:fld>
             <a:endParaRPr lang="en-US"/>
           </a:p>
@@ -1895,6 +1910,7 @@
           <a:p>
             <a:fld id="{96414F00-A310-6D42-B069-32C3B6104FF0}" type="slidenum">
               <a:rPr lang="en-US" smtClean="0"/>
+              <a:pPr/>
               <a:t>‹#›</a:t>
             </a:fld>
             <a:endParaRPr lang="en-US"/>
@@ -1943,7 +1959,8 @@
           <a:p>
             <a:fld id="{D3DF38D7-36C7-B34C-AE7F-468805AC0DF2}" type="datetimeFigureOut">
               <a:rPr lang="en-US" smtClean="0"/>
-              <a:t>5/11/10</a:t>
+              <a:pPr/>
+              <a:t>5/12/10</a:t>
             </a:fld>
             <a:endParaRPr lang="en-US"/>
           </a:p>
@@ -1985,6 +2002,7 @@
           <a:p>
             <a:fld id="{96414F00-A310-6D42-B069-32C3B6104FF0}" type="slidenum">
               <a:rPr lang="en-US" smtClean="0"/>
+              <a:pPr/>
               <a:t>‹#›</a:t>
             </a:fld>
             <a:endParaRPr lang="en-US"/>
@@ -2215,7 +2233,8 @@
           <a:p>
             <a:fld id="{D3DF38D7-36C7-B34C-AE7F-468805AC0DF2}" type="datetimeFigureOut">
               <a:rPr lang="en-US" smtClean="0"/>
-              <a:t>5/11/10</a:t>
+              <a:pPr/>
+              <a:t>5/12/10</a:t>
             </a:fld>
             <a:endParaRPr lang="en-US"/>
           </a:p>
@@ -2257,6 +2276,7 @@
           <a:p>
             <a:fld id="{96414F00-A310-6D42-B069-32C3B6104FF0}" type="slidenum">
               <a:rPr lang="en-US" smtClean="0"/>
+              <a:pPr/>
               <a:t>‹#›</a:t>
             </a:fld>
             <a:endParaRPr lang="en-US"/>
@@ -2463,7 +2483,8 @@
           <a:p>
             <a:fld id="{D3DF38D7-36C7-B34C-AE7F-468805AC0DF2}" type="datetimeFigureOut">
               <a:rPr lang="en-US" smtClean="0"/>
-              <a:t>5/11/10</a:t>
+              <a:pPr/>
+              <a:t>5/12/10</a:t>
             </a:fld>
             <a:endParaRPr lang="en-US"/>
           </a:p>
@@ -2505,6 +2526,7 @@
           <a:p>
             <a:fld id="{96414F00-A310-6D42-B069-32C3B6104FF0}" type="slidenum">
               <a:rPr lang="en-US" smtClean="0"/>
+              <a:pPr/>
               <a:t>‹#›</a:t>
             </a:fld>
             <a:endParaRPr lang="en-US"/>
@@ -2671,7 +2693,8 @@
           <a:p>
             <a:fld id="{D3DF38D7-36C7-B34C-AE7F-468805AC0DF2}" type="datetimeFigureOut">
               <a:rPr lang="en-US" smtClean="0"/>
-              <a:t>5/11/10</a:t>
+              <a:pPr/>
+              <a:t>5/12/10</a:t>
             </a:fld>
             <a:endParaRPr lang="en-US"/>
           </a:p>
@@ -2749,6 +2772,7 @@
           <a:p>
             <a:fld id="{96414F00-A310-6D42-B069-32C3B6104FF0}" type="slidenum">
               <a:rPr lang="en-US" smtClean="0"/>
+              <a:pPr/>
               <a:t>‹#›</a:t>
             </a:fld>
             <a:endParaRPr lang="en-US"/>
@@ -3728,25 +3752,30 @@
           </a:p>
         </p:txBody>
       </p:sp>
-      <p:sp>
-        <p:nvSpPr>
-          <p:cNvPr id="3" name="Content Placeholder 2"/>
-          <p:cNvSpPr>
-            <a:spLocks noGrp="1"/>
-          </p:cNvSpPr>
+      <p:pic>
+        <p:nvPicPr>
+          <p:cNvPr id="4" name="Content Placeholder 3" descr="performance.png"/>
+          <p:cNvPicPr>
+            <a:picLocks noGrp="1" noChangeAspect="1"/>
+          </p:cNvPicPr>
           <p:nvPr>
             <p:ph idx="1"/>
           </p:nvPr>
-        </p:nvSpPr>
-        <p:spPr/>
-        <p:txBody>
-          <a:bodyPr/>
-          <a:lstStyle/>
-          <a:p>
-            <a:endParaRPr lang="en-US"/>
-          </a:p>
-        </p:txBody>
-      </p:sp>
+        </p:nvPicPr>
+        <p:blipFill>
+          <a:blip r:embed="rId2"/>
+          <a:srcRect l="-12538" r="-12538"/>
+          <a:stretch>
+            <a:fillRect/>
+          </a:stretch>
+        </p:blipFill>
+        <p:spPr>
+          <a:xfrm>
+            <a:off x="-714237" y="1143000"/>
+            <a:ext cx="10391637" cy="5715000"/>
+          </a:xfrm>
+        </p:spPr>
+      </p:pic>
     </p:spTree>
   </p:cSld>
   <p:clrMapOvr>

</xml_diff>